<commit_message>
clean up and new results for sahar's paper
</commit_message>
<xml_diff>
--- a/aim2/Presentation2.pptx
+++ b/aim2/Presentation2.pptx
@@ -14,6 +14,7 @@
     <p:sldId id="266" r:id="rId8"/>
     <p:sldId id="267" r:id="rId9"/>
     <p:sldId id="268" r:id="rId10"/>
+    <p:sldId id="269" r:id="rId11"/>
   </p:sldIdLst>
   <p:sldSz cx="24384000" cy="13716000"/>
   <p:notesSz cx="6858000" cy="9144000"/>
@@ -19667,7 +19668,7 @@
           <a:p>
             <a:fld id="{FA504883-DD2C-8046-A0FC-F2BBEA5B9BFD}" type="datetimeFigureOut">
               <a:rPr lang="en-US" smtClean="0"/>
-              <a:t>10/5/22</a:t>
+              <a:t>1/23/23</a:t>
             </a:fld>
             <a:endParaRPr lang="en-US"/>
           </a:p>
@@ -19837,7 +19838,7 @@
           <a:p>
             <a:fld id="{FA504883-DD2C-8046-A0FC-F2BBEA5B9BFD}" type="datetimeFigureOut">
               <a:rPr lang="en-US" smtClean="0"/>
-              <a:t>10/5/22</a:t>
+              <a:t>1/23/23</a:t>
             </a:fld>
             <a:endParaRPr lang="en-US"/>
           </a:p>
@@ -20017,7 +20018,7 @@
           <a:p>
             <a:fld id="{FA504883-DD2C-8046-A0FC-F2BBEA5B9BFD}" type="datetimeFigureOut">
               <a:rPr lang="en-US" smtClean="0"/>
-              <a:t>10/5/22</a:t>
+              <a:t>1/23/23</a:t>
             </a:fld>
             <a:endParaRPr lang="en-US"/>
           </a:p>
@@ -20187,7 +20188,7 @@
           <a:p>
             <a:fld id="{FA504883-DD2C-8046-A0FC-F2BBEA5B9BFD}" type="datetimeFigureOut">
               <a:rPr lang="en-US" smtClean="0"/>
-              <a:t>10/5/22</a:t>
+              <a:t>1/23/23</a:t>
             </a:fld>
             <a:endParaRPr lang="en-US"/>
           </a:p>
@@ -20433,7 +20434,7 @@
           <a:p>
             <a:fld id="{FA504883-DD2C-8046-A0FC-F2BBEA5B9BFD}" type="datetimeFigureOut">
               <a:rPr lang="en-US" smtClean="0"/>
-              <a:t>10/5/22</a:t>
+              <a:t>1/23/23</a:t>
             </a:fld>
             <a:endParaRPr lang="en-US"/>
           </a:p>
@@ -20665,7 +20666,7 @@
           <a:p>
             <a:fld id="{FA504883-DD2C-8046-A0FC-F2BBEA5B9BFD}" type="datetimeFigureOut">
               <a:rPr lang="en-US" smtClean="0"/>
-              <a:t>10/5/22</a:t>
+              <a:t>1/23/23</a:t>
             </a:fld>
             <a:endParaRPr lang="en-US"/>
           </a:p>
@@ -21032,7 +21033,7 @@
           <a:p>
             <a:fld id="{FA504883-DD2C-8046-A0FC-F2BBEA5B9BFD}" type="datetimeFigureOut">
               <a:rPr lang="en-US" smtClean="0"/>
-              <a:t>10/5/22</a:t>
+              <a:t>1/23/23</a:t>
             </a:fld>
             <a:endParaRPr lang="en-US"/>
           </a:p>
@@ -21150,7 +21151,7 @@
           <a:p>
             <a:fld id="{FA504883-DD2C-8046-A0FC-F2BBEA5B9BFD}" type="datetimeFigureOut">
               <a:rPr lang="en-US" smtClean="0"/>
-              <a:t>10/5/22</a:t>
+              <a:t>1/23/23</a:t>
             </a:fld>
             <a:endParaRPr lang="en-US"/>
           </a:p>
@@ -21245,7 +21246,7 @@
           <a:p>
             <a:fld id="{FA504883-DD2C-8046-A0FC-F2BBEA5B9BFD}" type="datetimeFigureOut">
               <a:rPr lang="en-US" smtClean="0"/>
-              <a:t>10/5/22</a:t>
+              <a:t>1/23/23</a:t>
             </a:fld>
             <a:endParaRPr lang="en-US"/>
           </a:p>
@@ -21522,7 +21523,7 @@
           <a:p>
             <a:fld id="{FA504883-DD2C-8046-A0FC-F2BBEA5B9BFD}" type="datetimeFigureOut">
               <a:rPr lang="en-US" smtClean="0"/>
-              <a:t>10/5/22</a:t>
+              <a:t>1/23/23</a:t>
             </a:fld>
             <a:endParaRPr lang="en-US"/>
           </a:p>
@@ -21779,7 +21780,7 @@
           <a:p>
             <a:fld id="{FA504883-DD2C-8046-A0FC-F2BBEA5B9BFD}" type="datetimeFigureOut">
               <a:rPr lang="en-US" smtClean="0"/>
-              <a:t>10/5/22</a:t>
+              <a:t>1/23/23</a:t>
             </a:fld>
             <a:endParaRPr lang="en-US"/>
           </a:p>
@@ -21992,7 +21993,7 @@
           <a:p>
             <a:fld id="{FA504883-DD2C-8046-A0FC-F2BBEA5B9BFD}" type="datetimeFigureOut">
               <a:rPr lang="en-US" smtClean="0"/>
-              <a:t>10/5/22</a:t>
+              <a:t>1/23/23</a:t>
             </a:fld>
             <a:endParaRPr lang="en-US"/>
           </a:p>
@@ -22431,6 +22432,1610 @@
     <p:extLst>
       <p:ext uri="{BB962C8B-B14F-4D97-AF65-F5344CB8AC3E}">
         <p14:creationId xmlns:p14="http://schemas.microsoft.com/office/powerpoint/2010/main" val="1605094326"/>
+      </p:ext>
+    </p:extLst>
+  </p:cSld>
+  <p:clrMapOvr>
+    <a:masterClrMapping/>
+  </p:clrMapOvr>
+</p:sld>
+</file>
+
+<file path=ppt/slides/slide10.xml><?xml version="1.0" encoding="utf-8"?>
+<p:sld xmlns:a="http://schemas.openxmlformats.org/drawingml/2006/main" xmlns:r="http://schemas.openxmlformats.org/officeDocument/2006/relationships" xmlns:p="http://schemas.openxmlformats.org/presentationml/2006/main">
+  <p:cSld>
+    <p:spTree>
+      <p:nvGrpSpPr>
+        <p:cNvPr id="1" name=""/>
+        <p:cNvGrpSpPr/>
+        <p:nvPr/>
+      </p:nvGrpSpPr>
+      <p:grpSpPr>
+        <a:xfrm>
+          <a:off x="0" y="0"/>
+          <a:ext cx="0" cy="0"/>
+          <a:chOff x="0" y="0"/>
+          <a:chExt cx="0" cy="0"/>
+        </a:xfrm>
+      </p:grpSpPr>
+      <p:sp>
+        <p:nvSpPr>
+          <p:cNvPr id="38" name="Rectangle 37">
+            <a:extLst>
+              <a:ext uri="{FF2B5EF4-FFF2-40B4-BE49-F238E27FC236}">
+                <a16:creationId xmlns:a16="http://schemas.microsoft.com/office/drawing/2014/main" id="{DC4B2024-0CA6-C3E9-EF2B-079A4A02F4A2}"/>
+              </a:ext>
+            </a:extLst>
+          </p:cNvPr>
+          <p:cNvSpPr/>
+          <p:nvPr/>
+        </p:nvSpPr>
+        <p:spPr>
+          <a:xfrm>
+            <a:off x="3193784" y="1136822"/>
+            <a:ext cx="8106033" cy="3586367"/>
+          </a:xfrm>
+          <a:prstGeom prst="rect">
+            <a:avLst/>
+          </a:prstGeom>
+          <a:solidFill>
+            <a:schemeClr val="bg2">
+              <a:lumMod val="90000"/>
+            </a:schemeClr>
+          </a:solidFill>
+        </p:spPr>
+        <p:style>
+          <a:lnRef idx="2">
+            <a:schemeClr val="accent1">
+              <a:shade val="50000"/>
+            </a:schemeClr>
+          </a:lnRef>
+          <a:fillRef idx="1">
+            <a:schemeClr val="accent1"/>
+          </a:fillRef>
+          <a:effectRef idx="0">
+            <a:schemeClr val="accent1"/>
+          </a:effectRef>
+          <a:fontRef idx="minor">
+            <a:schemeClr val="lt1"/>
+          </a:fontRef>
+        </p:style>
+        <p:txBody>
+          <a:bodyPr rtlCol="0" anchor="ctr"/>
+          <a:lstStyle/>
+          <a:p>
+            <a:pPr algn="ctr"/>
+            <a:endParaRPr lang="en-US"/>
+          </a:p>
+        </p:txBody>
+      </p:sp>
+      <p:sp>
+        <p:nvSpPr>
+          <p:cNvPr id="39" name="Rectangle 38">
+            <a:extLst>
+              <a:ext uri="{FF2B5EF4-FFF2-40B4-BE49-F238E27FC236}">
+                <a16:creationId xmlns:a16="http://schemas.microsoft.com/office/drawing/2014/main" id="{A2C04B4E-3084-3811-C76B-959A16925913}"/>
+              </a:ext>
+            </a:extLst>
+          </p:cNvPr>
+          <p:cNvSpPr/>
+          <p:nvPr/>
+        </p:nvSpPr>
+        <p:spPr>
+          <a:xfrm>
+            <a:off x="4802078" y="4989002"/>
+            <a:ext cx="8106033" cy="3315262"/>
+          </a:xfrm>
+          <a:prstGeom prst="rect">
+            <a:avLst/>
+          </a:prstGeom>
+          <a:solidFill>
+            <a:schemeClr val="bg2">
+              <a:lumMod val="90000"/>
+            </a:schemeClr>
+          </a:solidFill>
+        </p:spPr>
+        <p:style>
+          <a:lnRef idx="2">
+            <a:schemeClr val="accent1">
+              <a:shade val="50000"/>
+            </a:schemeClr>
+          </a:lnRef>
+          <a:fillRef idx="1">
+            <a:schemeClr val="accent1"/>
+          </a:fillRef>
+          <a:effectRef idx="0">
+            <a:schemeClr val="accent1"/>
+          </a:effectRef>
+          <a:fontRef idx="minor">
+            <a:schemeClr val="lt1"/>
+          </a:fontRef>
+        </p:style>
+        <p:txBody>
+          <a:bodyPr rtlCol="0" anchor="ctr"/>
+          <a:lstStyle/>
+          <a:p>
+            <a:pPr algn="ctr"/>
+            <a:endParaRPr lang="en-US"/>
+          </a:p>
+        </p:txBody>
+      </p:sp>
+      <p:sp>
+        <p:nvSpPr>
+          <p:cNvPr id="40" name="Rectangle 39">
+            <a:extLst>
+              <a:ext uri="{FF2B5EF4-FFF2-40B4-BE49-F238E27FC236}">
+                <a16:creationId xmlns:a16="http://schemas.microsoft.com/office/drawing/2014/main" id="{C072619D-299E-1620-3B2A-74267DB37A59}"/>
+              </a:ext>
+            </a:extLst>
+          </p:cNvPr>
+          <p:cNvSpPr/>
+          <p:nvPr/>
+        </p:nvSpPr>
+        <p:spPr>
+          <a:xfrm>
+            <a:off x="13197209" y="7274680"/>
+            <a:ext cx="8811515" cy="4884369"/>
+          </a:xfrm>
+          <a:prstGeom prst="rect">
+            <a:avLst/>
+          </a:prstGeom>
+          <a:solidFill>
+            <a:schemeClr val="bg2">
+              <a:lumMod val="90000"/>
+            </a:schemeClr>
+          </a:solidFill>
+        </p:spPr>
+        <p:style>
+          <a:lnRef idx="2">
+            <a:schemeClr val="accent1">
+              <a:shade val="50000"/>
+            </a:schemeClr>
+          </a:lnRef>
+          <a:fillRef idx="1">
+            <a:schemeClr val="accent1"/>
+          </a:fillRef>
+          <a:effectRef idx="0">
+            <a:schemeClr val="accent1"/>
+          </a:effectRef>
+          <a:fontRef idx="minor">
+            <a:schemeClr val="lt1"/>
+          </a:fontRef>
+        </p:style>
+        <p:txBody>
+          <a:bodyPr rtlCol="0" anchor="ctr"/>
+          <a:lstStyle/>
+          <a:p>
+            <a:pPr algn="ctr"/>
+            <a:endParaRPr lang="en-US"/>
+          </a:p>
+        </p:txBody>
+      </p:sp>
+      <p:sp>
+        <p:nvSpPr>
+          <p:cNvPr id="4" name="Rectangle 3">
+            <a:extLst>
+              <a:ext uri="{FF2B5EF4-FFF2-40B4-BE49-F238E27FC236}">
+                <a16:creationId xmlns:a16="http://schemas.microsoft.com/office/drawing/2014/main" id="{7F3D3CF0-37FF-BD4E-9456-E7DF94EE858A}"/>
+              </a:ext>
+            </a:extLst>
+          </p:cNvPr>
+          <p:cNvSpPr/>
+          <p:nvPr/>
+        </p:nvSpPr>
+        <p:spPr>
+          <a:xfrm>
+            <a:off x="467833" y="531628"/>
+            <a:ext cx="1169581" cy="1765005"/>
+          </a:xfrm>
+          <a:prstGeom prst="rect">
+            <a:avLst/>
+          </a:prstGeom>
+        </p:spPr>
+        <p:style>
+          <a:lnRef idx="2">
+            <a:schemeClr val="accent1">
+              <a:shade val="50000"/>
+            </a:schemeClr>
+          </a:lnRef>
+          <a:fillRef idx="1">
+            <a:schemeClr val="accent1"/>
+          </a:fillRef>
+          <a:effectRef idx="0">
+            <a:schemeClr val="accent1"/>
+          </a:effectRef>
+          <a:fontRef idx="minor">
+            <a:schemeClr val="lt1"/>
+          </a:fontRef>
+        </p:style>
+        <p:txBody>
+          <a:bodyPr rtlCol="0" anchor="ctr"/>
+          <a:lstStyle/>
+          <a:p>
+            <a:pPr algn="ctr"/>
+            <a:r>
+              <a:rPr lang="en-US" sz="4000" dirty="0"/>
+              <a:t>X</a:t>
+            </a:r>
+          </a:p>
+        </p:txBody>
+      </p:sp>
+      <p:sp>
+        <p:nvSpPr>
+          <p:cNvPr id="5" name="Rectangle 4">
+            <a:extLst>
+              <a:ext uri="{FF2B5EF4-FFF2-40B4-BE49-F238E27FC236}">
+                <a16:creationId xmlns:a16="http://schemas.microsoft.com/office/drawing/2014/main" id="{89C6132E-60FD-CFCD-4D55-FAA2D15684E6}"/>
+              </a:ext>
+            </a:extLst>
+          </p:cNvPr>
+          <p:cNvSpPr/>
+          <p:nvPr/>
+        </p:nvSpPr>
+        <p:spPr>
+          <a:xfrm>
+            <a:off x="467832" y="2296633"/>
+            <a:ext cx="1169581" cy="1765005"/>
+          </a:xfrm>
+          <a:prstGeom prst="rect">
+            <a:avLst/>
+          </a:prstGeom>
+          <a:solidFill>
+            <a:schemeClr val="accent2"/>
+          </a:solidFill>
+        </p:spPr>
+        <p:style>
+          <a:lnRef idx="2">
+            <a:schemeClr val="accent1">
+              <a:shade val="50000"/>
+            </a:schemeClr>
+          </a:lnRef>
+          <a:fillRef idx="1">
+            <a:schemeClr val="accent1"/>
+          </a:fillRef>
+          <a:effectRef idx="0">
+            <a:schemeClr val="accent1"/>
+          </a:effectRef>
+          <a:fontRef idx="minor">
+            <a:schemeClr val="lt1"/>
+          </a:fontRef>
+        </p:style>
+        <p:txBody>
+          <a:bodyPr rtlCol="0" anchor="ctr"/>
+          <a:lstStyle/>
+          <a:p>
+            <a:pPr algn="ctr"/>
+            <a:r>
+              <a:rPr lang="en-US" sz="4000" dirty="0"/>
+              <a:t>Y</a:t>
+            </a:r>
+          </a:p>
+        </p:txBody>
+      </p:sp>
+      <p:sp>
+        <p:nvSpPr>
+          <p:cNvPr id="6" name="Rectangle 5">
+            <a:extLst>
+              <a:ext uri="{FF2B5EF4-FFF2-40B4-BE49-F238E27FC236}">
+                <a16:creationId xmlns:a16="http://schemas.microsoft.com/office/drawing/2014/main" id="{4011DF49-E75D-B0F7-AF3D-97330F4C0496}"/>
+              </a:ext>
+            </a:extLst>
+          </p:cNvPr>
+          <p:cNvSpPr/>
+          <p:nvPr/>
+        </p:nvSpPr>
+        <p:spPr>
+          <a:xfrm>
+            <a:off x="467831" y="4061638"/>
+            <a:ext cx="1169581" cy="1765005"/>
+          </a:xfrm>
+          <a:prstGeom prst="rect">
+            <a:avLst/>
+          </a:prstGeom>
+          <a:solidFill>
+            <a:schemeClr val="accent6">
+              <a:lumMod val="75000"/>
+            </a:schemeClr>
+          </a:solidFill>
+        </p:spPr>
+        <p:style>
+          <a:lnRef idx="2">
+            <a:schemeClr val="accent1">
+              <a:shade val="50000"/>
+            </a:schemeClr>
+          </a:lnRef>
+          <a:fillRef idx="1">
+            <a:schemeClr val="accent1"/>
+          </a:fillRef>
+          <a:effectRef idx="0">
+            <a:schemeClr val="accent1"/>
+          </a:effectRef>
+          <a:fontRef idx="minor">
+            <a:schemeClr val="lt1"/>
+          </a:fontRef>
+        </p:style>
+        <p:txBody>
+          <a:bodyPr rtlCol="0" anchor="ctr"/>
+          <a:lstStyle/>
+          <a:p>
+            <a:pPr algn="ctr"/>
+            <a:r>
+              <a:rPr lang="en-US" sz="4000" dirty="0"/>
+              <a:t>T</a:t>
+            </a:r>
+          </a:p>
+        </p:txBody>
+      </p:sp>
+      <p:sp>
+        <p:nvSpPr>
+          <p:cNvPr id="7" name="Rectangle 6">
+            <a:extLst>
+              <a:ext uri="{FF2B5EF4-FFF2-40B4-BE49-F238E27FC236}">
+                <a16:creationId xmlns:a16="http://schemas.microsoft.com/office/drawing/2014/main" id="{FEB208B8-7040-FE4A-EC7A-323AD4799DCC}"/>
+              </a:ext>
+            </a:extLst>
+          </p:cNvPr>
+          <p:cNvSpPr/>
+          <p:nvPr/>
+        </p:nvSpPr>
+        <p:spPr>
+          <a:xfrm>
+            <a:off x="6077220" y="2359724"/>
+            <a:ext cx="1169581" cy="1765005"/>
+          </a:xfrm>
+          <a:prstGeom prst="rect">
+            <a:avLst/>
+          </a:prstGeom>
+        </p:spPr>
+        <p:style>
+          <a:lnRef idx="2">
+            <a:schemeClr val="accent1">
+              <a:shade val="50000"/>
+            </a:schemeClr>
+          </a:lnRef>
+          <a:fillRef idx="1">
+            <a:schemeClr val="accent1"/>
+          </a:fillRef>
+          <a:effectRef idx="0">
+            <a:schemeClr val="accent1"/>
+          </a:effectRef>
+          <a:fontRef idx="minor">
+            <a:schemeClr val="lt1"/>
+          </a:fontRef>
+        </p:style>
+        <p:txBody>
+          <a:bodyPr rtlCol="0" anchor="ctr"/>
+          <a:lstStyle/>
+          <a:p>
+            <a:pPr algn="ctr"/>
+            <a:r>
+              <a:rPr lang="en-US" sz="4000" dirty="0"/>
+              <a:t>X</a:t>
+            </a:r>
+          </a:p>
+        </p:txBody>
+      </p:sp>
+      <p:sp>
+        <p:nvSpPr>
+          <p:cNvPr id="8" name="Rectangle 7">
+            <a:extLst>
+              <a:ext uri="{FF2B5EF4-FFF2-40B4-BE49-F238E27FC236}">
+                <a16:creationId xmlns:a16="http://schemas.microsoft.com/office/drawing/2014/main" id="{35B4CBC1-5400-6A8D-9808-3E2E9C2D2BBC}"/>
+              </a:ext>
+            </a:extLst>
+          </p:cNvPr>
+          <p:cNvSpPr/>
+          <p:nvPr/>
+        </p:nvSpPr>
+        <p:spPr>
+          <a:xfrm>
+            <a:off x="3716791" y="2359724"/>
+            <a:ext cx="1169581" cy="1765005"/>
+          </a:xfrm>
+          <a:prstGeom prst="rect">
+            <a:avLst/>
+          </a:prstGeom>
+          <a:solidFill>
+            <a:schemeClr val="accent2"/>
+          </a:solidFill>
+        </p:spPr>
+        <p:style>
+          <a:lnRef idx="2">
+            <a:schemeClr val="accent1">
+              <a:shade val="50000"/>
+            </a:schemeClr>
+          </a:lnRef>
+          <a:fillRef idx="1">
+            <a:schemeClr val="accent1"/>
+          </a:fillRef>
+          <a:effectRef idx="0">
+            <a:schemeClr val="accent1"/>
+          </a:effectRef>
+          <a:fontRef idx="minor">
+            <a:schemeClr val="lt1"/>
+          </a:fontRef>
+        </p:style>
+        <p:txBody>
+          <a:bodyPr rtlCol="0" anchor="ctr"/>
+          <a:lstStyle/>
+          <a:p>
+            <a:pPr algn="ctr"/>
+            <a:r>
+              <a:rPr lang="en-US" sz="4000" dirty="0"/>
+              <a:t>Y</a:t>
+            </a:r>
+          </a:p>
+        </p:txBody>
+      </p:sp>
+      <p:sp>
+        <p:nvSpPr>
+          <p:cNvPr id="9" name="Rectangle 8">
+            <a:extLst>
+              <a:ext uri="{FF2B5EF4-FFF2-40B4-BE49-F238E27FC236}">
+                <a16:creationId xmlns:a16="http://schemas.microsoft.com/office/drawing/2014/main" id="{570C3881-EB1E-4BFA-DEDB-233F7B97144E}"/>
+              </a:ext>
+            </a:extLst>
+          </p:cNvPr>
+          <p:cNvSpPr/>
+          <p:nvPr/>
+        </p:nvSpPr>
+        <p:spPr>
+          <a:xfrm>
+            <a:off x="5338788" y="6047343"/>
+            <a:ext cx="1169581" cy="1765005"/>
+          </a:xfrm>
+          <a:prstGeom prst="rect">
+            <a:avLst/>
+          </a:prstGeom>
+          <a:solidFill>
+            <a:schemeClr val="accent6">
+              <a:lumMod val="75000"/>
+            </a:schemeClr>
+          </a:solidFill>
+        </p:spPr>
+        <p:style>
+          <a:lnRef idx="2">
+            <a:schemeClr val="accent1">
+              <a:shade val="50000"/>
+            </a:schemeClr>
+          </a:lnRef>
+          <a:fillRef idx="1">
+            <a:schemeClr val="accent1"/>
+          </a:fillRef>
+          <a:effectRef idx="0">
+            <a:schemeClr val="accent1"/>
+          </a:effectRef>
+          <a:fontRef idx="minor">
+            <a:schemeClr val="lt1"/>
+          </a:fontRef>
+        </p:style>
+        <p:txBody>
+          <a:bodyPr rtlCol="0" anchor="ctr"/>
+          <a:lstStyle/>
+          <a:p>
+            <a:pPr algn="ctr"/>
+            <a:r>
+              <a:rPr lang="en-US" sz="4000" dirty="0"/>
+              <a:t>T</a:t>
+            </a:r>
+          </a:p>
+        </p:txBody>
+      </p:sp>
+      <p:sp>
+        <p:nvSpPr>
+          <p:cNvPr id="10" name="Rectangle 9">
+            <a:extLst>
+              <a:ext uri="{FF2B5EF4-FFF2-40B4-BE49-F238E27FC236}">
+                <a16:creationId xmlns:a16="http://schemas.microsoft.com/office/drawing/2014/main" id="{8C2A7A95-9A70-7D57-D71A-6243BB7C58E5}"/>
+              </a:ext>
+            </a:extLst>
+          </p:cNvPr>
+          <p:cNvSpPr/>
+          <p:nvPr/>
+        </p:nvSpPr>
+        <p:spPr>
+          <a:xfrm>
+            <a:off x="7699217" y="6047342"/>
+            <a:ext cx="1169581" cy="1765005"/>
+          </a:xfrm>
+          <a:prstGeom prst="rect">
+            <a:avLst/>
+          </a:prstGeom>
+        </p:spPr>
+        <p:style>
+          <a:lnRef idx="2">
+            <a:schemeClr val="accent1">
+              <a:shade val="50000"/>
+            </a:schemeClr>
+          </a:lnRef>
+          <a:fillRef idx="1">
+            <a:schemeClr val="accent1"/>
+          </a:fillRef>
+          <a:effectRef idx="0">
+            <a:schemeClr val="accent1"/>
+          </a:effectRef>
+          <a:fontRef idx="minor">
+            <a:schemeClr val="lt1"/>
+          </a:fontRef>
+        </p:style>
+        <p:txBody>
+          <a:bodyPr rtlCol="0" anchor="ctr"/>
+          <a:lstStyle/>
+          <a:p>
+            <a:pPr algn="ctr"/>
+            <a:r>
+              <a:rPr lang="en-US" sz="4000" dirty="0"/>
+              <a:t>X</a:t>
+            </a:r>
+          </a:p>
+        </p:txBody>
+      </p:sp>
+      <p:sp>
+        <p:nvSpPr>
+          <p:cNvPr id="11" name="Left Arrow 10">
+            <a:extLst>
+              <a:ext uri="{FF2B5EF4-FFF2-40B4-BE49-F238E27FC236}">
+                <a16:creationId xmlns:a16="http://schemas.microsoft.com/office/drawing/2014/main" id="{1905D8FB-6DA1-3975-7353-325FA97764D4}"/>
+              </a:ext>
+            </a:extLst>
+          </p:cNvPr>
+          <p:cNvSpPr/>
+          <p:nvPr/>
+        </p:nvSpPr>
+        <p:spPr>
+          <a:xfrm>
+            <a:off x="4886372" y="2625537"/>
+            <a:ext cx="1190848" cy="1233376"/>
+          </a:xfrm>
+          <a:prstGeom prst="leftArrow">
+            <a:avLst>
+              <a:gd name="adj1" fmla="val 50000"/>
+              <a:gd name="adj2" fmla="val 50000"/>
+            </a:avLst>
+          </a:prstGeom>
+          <a:solidFill>
+            <a:schemeClr val="accent4">
+              <a:lumMod val="20000"/>
+              <a:lumOff val="80000"/>
+            </a:schemeClr>
+          </a:solidFill>
+        </p:spPr>
+        <p:style>
+          <a:lnRef idx="2">
+            <a:schemeClr val="accent1">
+              <a:shade val="50000"/>
+            </a:schemeClr>
+          </a:lnRef>
+          <a:fillRef idx="1">
+            <a:schemeClr val="accent1"/>
+          </a:fillRef>
+          <a:effectRef idx="0">
+            <a:schemeClr val="accent1"/>
+          </a:effectRef>
+          <a:fontRef idx="minor">
+            <a:schemeClr val="lt1"/>
+          </a:fontRef>
+        </p:style>
+        <p:txBody>
+          <a:bodyPr rtlCol="0" anchor="ctr"/>
+          <a:lstStyle/>
+          <a:p>
+            <a:pPr algn="ctr"/>
+            <a:r>
+              <a:rPr lang="en-US" dirty="0">
+                <a:ln>
+                  <a:solidFill>
+                    <a:sysClr val="windowText" lastClr="000000"/>
+                  </a:solidFill>
+                </a:ln>
+              </a:rPr>
+              <a:t>GNN</a:t>
+            </a:r>
+          </a:p>
+          <a:p>
+            <a:pPr algn="ctr"/>
+            <a:r>
+              <a:rPr lang="en-US" dirty="0">
+                <a:ln>
+                  <a:solidFill>
+                    <a:sysClr val="windowText" lastClr="000000"/>
+                  </a:solidFill>
+                </a:ln>
+              </a:rPr>
+              <a:t>regress</a:t>
+            </a:r>
+          </a:p>
+        </p:txBody>
+      </p:sp>
+      <p:sp>
+        <p:nvSpPr>
+          <p:cNvPr id="14" name="Rectangle 13">
+            <a:extLst>
+              <a:ext uri="{FF2B5EF4-FFF2-40B4-BE49-F238E27FC236}">
+                <a16:creationId xmlns:a16="http://schemas.microsoft.com/office/drawing/2014/main" id="{577604A9-C592-8267-164A-F19A607E7BA5}"/>
+              </a:ext>
+            </a:extLst>
+          </p:cNvPr>
+          <p:cNvSpPr/>
+          <p:nvPr/>
+        </p:nvSpPr>
+        <p:spPr>
+          <a:xfrm>
+            <a:off x="9461921" y="2359723"/>
+            <a:ext cx="1169581" cy="1765005"/>
+          </a:xfrm>
+          <a:prstGeom prst="rect">
+            <a:avLst/>
+          </a:prstGeom>
+          <a:solidFill>
+            <a:schemeClr val="accent2">
+              <a:lumMod val="40000"/>
+              <a:lumOff val="60000"/>
+            </a:schemeClr>
+          </a:solidFill>
+        </p:spPr>
+        <p:style>
+          <a:lnRef idx="2">
+            <a:schemeClr val="accent1">
+              <a:shade val="50000"/>
+            </a:schemeClr>
+          </a:lnRef>
+          <a:fillRef idx="1">
+            <a:schemeClr val="accent1"/>
+          </a:fillRef>
+          <a:effectRef idx="0">
+            <a:schemeClr val="accent1"/>
+          </a:effectRef>
+          <a:fontRef idx="minor">
+            <a:schemeClr val="lt1"/>
+          </a:fontRef>
+        </p:style>
+        <p:txBody>
+          <a:bodyPr rtlCol="0" anchor="ctr"/>
+          <a:lstStyle/>
+          <a:p>
+            <a:pPr algn="ctr"/>
+            <a:r>
+              <a:rPr lang="en-US" sz="4000" dirty="0" err="1">
+                <a:solidFill>
+                  <a:schemeClr val="tx1"/>
+                </a:solidFill>
+              </a:rPr>
+              <a:t>ε</a:t>
+            </a:r>
+            <a:r>
+              <a:rPr lang="en-US" sz="4000" baseline="-25000" dirty="0" err="1">
+                <a:solidFill>
+                  <a:schemeClr val="tx1"/>
+                </a:solidFill>
+              </a:rPr>
+              <a:t>Y</a:t>
+            </a:r>
+            <a:endParaRPr lang="en-US" sz="4000" baseline="-25000" dirty="0">
+              <a:solidFill>
+                <a:schemeClr val="tx1"/>
+              </a:solidFill>
+            </a:endParaRPr>
+          </a:p>
+        </p:txBody>
+      </p:sp>
+      <p:sp>
+        <p:nvSpPr>
+          <p:cNvPr id="15" name="Rectangle 14">
+            <a:extLst>
+              <a:ext uri="{FF2B5EF4-FFF2-40B4-BE49-F238E27FC236}">
+                <a16:creationId xmlns:a16="http://schemas.microsoft.com/office/drawing/2014/main" id="{19152C46-E5BC-B9D5-1F9A-FD45D10D4105}"/>
+              </a:ext>
+            </a:extLst>
+          </p:cNvPr>
+          <p:cNvSpPr/>
+          <p:nvPr/>
+        </p:nvSpPr>
+        <p:spPr>
+          <a:xfrm>
+            <a:off x="11083917" y="6047341"/>
+            <a:ext cx="1169581" cy="1765005"/>
+          </a:xfrm>
+          <a:prstGeom prst="rect">
+            <a:avLst/>
+          </a:prstGeom>
+          <a:solidFill>
+            <a:schemeClr val="accent6">
+              <a:lumMod val="40000"/>
+              <a:lumOff val="60000"/>
+            </a:schemeClr>
+          </a:solidFill>
+        </p:spPr>
+        <p:style>
+          <a:lnRef idx="2">
+            <a:schemeClr val="accent1">
+              <a:shade val="50000"/>
+            </a:schemeClr>
+          </a:lnRef>
+          <a:fillRef idx="1">
+            <a:schemeClr val="accent1"/>
+          </a:fillRef>
+          <a:effectRef idx="0">
+            <a:schemeClr val="accent1"/>
+          </a:effectRef>
+          <a:fontRef idx="minor">
+            <a:schemeClr val="lt1"/>
+          </a:fontRef>
+        </p:style>
+        <p:txBody>
+          <a:bodyPr rtlCol="0" anchor="ctr"/>
+          <a:lstStyle/>
+          <a:p>
+            <a:pPr algn="ctr"/>
+            <a:r>
+              <a:rPr lang="en-US" sz="4000" dirty="0" err="1">
+                <a:solidFill>
+                  <a:schemeClr val="tx1"/>
+                </a:solidFill>
+              </a:rPr>
+              <a:t>ε</a:t>
+            </a:r>
+            <a:r>
+              <a:rPr lang="en-US" sz="4000" baseline="-25000" dirty="0" err="1">
+                <a:solidFill>
+                  <a:schemeClr val="tx1"/>
+                </a:solidFill>
+              </a:rPr>
+              <a:t>T</a:t>
+            </a:r>
+            <a:endParaRPr lang="en-US" sz="4000" baseline="-25000" dirty="0">
+              <a:solidFill>
+                <a:schemeClr val="tx1"/>
+              </a:solidFill>
+            </a:endParaRPr>
+          </a:p>
+        </p:txBody>
+      </p:sp>
+      <p:sp>
+        <p:nvSpPr>
+          <p:cNvPr id="16" name="Rectangle 15">
+            <a:extLst>
+              <a:ext uri="{FF2B5EF4-FFF2-40B4-BE49-F238E27FC236}">
+                <a16:creationId xmlns:a16="http://schemas.microsoft.com/office/drawing/2014/main" id="{CF78B7F1-8168-6395-7C1A-3C6663E9EE0B}"/>
+              </a:ext>
+            </a:extLst>
+          </p:cNvPr>
+          <p:cNvSpPr/>
+          <p:nvPr/>
+        </p:nvSpPr>
+        <p:spPr>
+          <a:xfrm>
+            <a:off x="13459678" y="9186766"/>
+            <a:ext cx="1169581" cy="1765005"/>
+          </a:xfrm>
+          <a:prstGeom prst="rect">
+            <a:avLst/>
+          </a:prstGeom>
+          <a:solidFill>
+            <a:schemeClr val="accent2">
+              <a:lumMod val="40000"/>
+              <a:lumOff val="60000"/>
+            </a:schemeClr>
+          </a:solidFill>
+        </p:spPr>
+        <p:style>
+          <a:lnRef idx="2">
+            <a:schemeClr val="accent1">
+              <a:shade val="50000"/>
+            </a:schemeClr>
+          </a:lnRef>
+          <a:fillRef idx="1">
+            <a:schemeClr val="accent1"/>
+          </a:fillRef>
+          <a:effectRef idx="0">
+            <a:schemeClr val="accent1"/>
+          </a:effectRef>
+          <a:fontRef idx="minor">
+            <a:schemeClr val="lt1"/>
+          </a:fontRef>
+        </p:style>
+        <p:txBody>
+          <a:bodyPr rtlCol="0" anchor="ctr"/>
+          <a:lstStyle/>
+          <a:p>
+            <a:pPr algn="ctr"/>
+            <a:r>
+              <a:rPr lang="en-US" sz="4000" dirty="0" err="1">
+                <a:solidFill>
+                  <a:schemeClr val="tx1"/>
+                </a:solidFill>
+              </a:rPr>
+              <a:t>ε</a:t>
+            </a:r>
+            <a:r>
+              <a:rPr lang="en-US" sz="4000" baseline="-25000" dirty="0" err="1">
+                <a:solidFill>
+                  <a:schemeClr val="tx1"/>
+                </a:solidFill>
+              </a:rPr>
+              <a:t>Y</a:t>
+            </a:r>
+            <a:endParaRPr lang="en-US" sz="4000" baseline="-25000" dirty="0">
+              <a:solidFill>
+                <a:schemeClr val="tx1"/>
+              </a:solidFill>
+            </a:endParaRPr>
+          </a:p>
+        </p:txBody>
+      </p:sp>
+      <p:sp>
+        <p:nvSpPr>
+          <p:cNvPr id="17" name="Rectangle 16">
+            <a:extLst>
+              <a:ext uri="{FF2B5EF4-FFF2-40B4-BE49-F238E27FC236}">
+                <a16:creationId xmlns:a16="http://schemas.microsoft.com/office/drawing/2014/main" id="{F5EB03AE-511B-E64C-908F-68132B32FFE6}"/>
+              </a:ext>
+            </a:extLst>
+          </p:cNvPr>
+          <p:cNvSpPr/>
+          <p:nvPr/>
+        </p:nvSpPr>
+        <p:spPr>
+          <a:xfrm>
+            <a:off x="15820108" y="8304263"/>
+            <a:ext cx="1169581" cy="1765005"/>
+          </a:xfrm>
+          <a:prstGeom prst="rect">
+            <a:avLst/>
+          </a:prstGeom>
+          <a:solidFill>
+            <a:schemeClr val="accent6">
+              <a:lumMod val="40000"/>
+              <a:lumOff val="60000"/>
+            </a:schemeClr>
+          </a:solidFill>
+        </p:spPr>
+        <p:style>
+          <a:lnRef idx="2">
+            <a:schemeClr val="accent1">
+              <a:shade val="50000"/>
+            </a:schemeClr>
+          </a:lnRef>
+          <a:fillRef idx="1">
+            <a:schemeClr val="accent1"/>
+          </a:fillRef>
+          <a:effectRef idx="0">
+            <a:schemeClr val="accent1"/>
+          </a:effectRef>
+          <a:fontRef idx="minor">
+            <a:schemeClr val="lt1"/>
+          </a:fontRef>
+        </p:style>
+        <p:txBody>
+          <a:bodyPr rtlCol="0" anchor="ctr"/>
+          <a:lstStyle/>
+          <a:p>
+            <a:pPr algn="ctr"/>
+            <a:r>
+              <a:rPr lang="en-US" sz="4000" dirty="0" err="1">
+                <a:solidFill>
+                  <a:schemeClr val="tx1"/>
+                </a:solidFill>
+              </a:rPr>
+              <a:t>ε</a:t>
+            </a:r>
+            <a:r>
+              <a:rPr lang="en-US" sz="4000" baseline="-25000" dirty="0" err="1">
+                <a:solidFill>
+                  <a:schemeClr val="tx1"/>
+                </a:solidFill>
+              </a:rPr>
+              <a:t>T</a:t>
+            </a:r>
+            <a:endParaRPr lang="en-US" sz="4000" baseline="-25000" dirty="0">
+              <a:solidFill>
+                <a:schemeClr val="tx1"/>
+              </a:solidFill>
+            </a:endParaRPr>
+          </a:p>
+        </p:txBody>
+      </p:sp>
+      <p:sp>
+        <p:nvSpPr>
+          <p:cNvPr id="19" name="Left Arrow 18">
+            <a:extLst>
+              <a:ext uri="{FF2B5EF4-FFF2-40B4-BE49-F238E27FC236}">
+                <a16:creationId xmlns:a16="http://schemas.microsoft.com/office/drawing/2014/main" id="{E2F1C4AA-C3FF-1215-7E93-A9D9B8FFF206}"/>
+              </a:ext>
+            </a:extLst>
+          </p:cNvPr>
+          <p:cNvSpPr/>
+          <p:nvPr/>
+        </p:nvSpPr>
+        <p:spPr>
+          <a:xfrm>
+            <a:off x="6508369" y="6313155"/>
+            <a:ext cx="1190848" cy="1233376"/>
+          </a:xfrm>
+          <a:prstGeom prst="leftArrow">
+            <a:avLst>
+              <a:gd name="adj1" fmla="val 50000"/>
+              <a:gd name="adj2" fmla="val 50000"/>
+            </a:avLst>
+          </a:prstGeom>
+          <a:solidFill>
+            <a:schemeClr val="accent4">
+              <a:lumMod val="20000"/>
+              <a:lumOff val="80000"/>
+            </a:schemeClr>
+          </a:solidFill>
+        </p:spPr>
+        <p:style>
+          <a:lnRef idx="2">
+            <a:schemeClr val="accent1">
+              <a:shade val="50000"/>
+            </a:schemeClr>
+          </a:lnRef>
+          <a:fillRef idx="1">
+            <a:schemeClr val="accent1"/>
+          </a:fillRef>
+          <a:effectRef idx="0">
+            <a:schemeClr val="accent1"/>
+          </a:effectRef>
+          <a:fontRef idx="minor">
+            <a:schemeClr val="lt1"/>
+          </a:fontRef>
+        </p:style>
+        <p:txBody>
+          <a:bodyPr rtlCol="0" anchor="ctr"/>
+          <a:lstStyle/>
+          <a:p>
+            <a:pPr algn="ctr"/>
+            <a:r>
+              <a:rPr lang="en-US" dirty="0">
+                <a:ln>
+                  <a:solidFill>
+                    <a:sysClr val="windowText" lastClr="000000"/>
+                  </a:solidFill>
+                </a:ln>
+              </a:rPr>
+              <a:t>GNN</a:t>
+            </a:r>
+          </a:p>
+          <a:p>
+            <a:pPr algn="ctr"/>
+            <a:r>
+              <a:rPr lang="en-US" dirty="0">
+                <a:ln>
+                  <a:solidFill>
+                    <a:sysClr val="windowText" lastClr="000000"/>
+                  </a:solidFill>
+                </a:ln>
+              </a:rPr>
+              <a:t>regress</a:t>
+            </a:r>
+          </a:p>
+        </p:txBody>
+      </p:sp>
+      <p:sp>
+        <p:nvSpPr>
+          <p:cNvPr id="20" name="Left Arrow 19">
+            <a:extLst>
+              <a:ext uri="{FF2B5EF4-FFF2-40B4-BE49-F238E27FC236}">
+                <a16:creationId xmlns:a16="http://schemas.microsoft.com/office/drawing/2014/main" id="{FE3613BF-B9F2-EFCC-8C28-6518B5D787F4}"/>
+              </a:ext>
+            </a:extLst>
+          </p:cNvPr>
+          <p:cNvSpPr/>
+          <p:nvPr/>
+        </p:nvSpPr>
+        <p:spPr>
+          <a:xfrm>
+            <a:off x="14629259" y="9565990"/>
+            <a:ext cx="1190848" cy="1233376"/>
+          </a:xfrm>
+          <a:prstGeom prst="leftArrow">
+            <a:avLst>
+              <a:gd name="adj1" fmla="val 50000"/>
+              <a:gd name="adj2" fmla="val 50000"/>
+            </a:avLst>
+          </a:prstGeom>
+          <a:solidFill>
+            <a:schemeClr val="accent4">
+              <a:lumMod val="20000"/>
+              <a:lumOff val="80000"/>
+            </a:schemeClr>
+          </a:solidFill>
+        </p:spPr>
+        <p:style>
+          <a:lnRef idx="2">
+            <a:schemeClr val="accent1">
+              <a:shade val="50000"/>
+            </a:schemeClr>
+          </a:lnRef>
+          <a:fillRef idx="1">
+            <a:schemeClr val="accent1"/>
+          </a:fillRef>
+          <a:effectRef idx="0">
+            <a:schemeClr val="accent1"/>
+          </a:effectRef>
+          <a:fontRef idx="minor">
+            <a:schemeClr val="lt1"/>
+          </a:fontRef>
+        </p:style>
+        <p:txBody>
+          <a:bodyPr rtlCol="0" anchor="ctr"/>
+          <a:lstStyle/>
+          <a:p>
+            <a:pPr algn="ctr"/>
+            <a:r>
+              <a:rPr lang="en-US" dirty="0">
+                <a:ln>
+                  <a:solidFill>
+                    <a:sysClr val="windowText" lastClr="000000"/>
+                  </a:solidFill>
+                </a:ln>
+              </a:rPr>
+              <a:t>GNN</a:t>
+            </a:r>
+          </a:p>
+          <a:p>
+            <a:pPr algn="ctr"/>
+            <a:r>
+              <a:rPr lang="en-US" dirty="0">
+                <a:ln>
+                  <a:solidFill>
+                    <a:sysClr val="windowText" lastClr="000000"/>
+                  </a:solidFill>
+                </a:ln>
+              </a:rPr>
+              <a:t>regress</a:t>
+            </a:r>
+          </a:p>
+        </p:txBody>
+      </p:sp>
+      <p:sp>
+        <p:nvSpPr>
+          <p:cNvPr id="22" name="Rectangle 21">
+            <a:extLst>
+              <a:ext uri="{FF2B5EF4-FFF2-40B4-BE49-F238E27FC236}">
+                <a16:creationId xmlns:a16="http://schemas.microsoft.com/office/drawing/2014/main" id="{B295B120-23FB-8648-0CE3-40C101D9AB28}"/>
+              </a:ext>
+            </a:extLst>
+          </p:cNvPr>
+          <p:cNvSpPr/>
+          <p:nvPr/>
+        </p:nvSpPr>
+        <p:spPr>
+          <a:xfrm>
+            <a:off x="15820107" y="10069268"/>
+            <a:ext cx="1169581" cy="1765005"/>
+          </a:xfrm>
+          <a:prstGeom prst="rect">
+            <a:avLst/>
+          </a:prstGeom>
+        </p:spPr>
+        <p:style>
+          <a:lnRef idx="2">
+            <a:schemeClr val="accent1">
+              <a:shade val="50000"/>
+            </a:schemeClr>
+          </a:lnRef>
+          <a:fillRef idx="1">
+            <a:schemeClr val="accent1"/>
+          </a:fillRef>
+          <a:effectRef idx="0">
+            <a:schemeClr val="accent1"/>
+          </a:effectRef>
+          <a:fontRef idx="minor">
+            <a:schemeClr val="lt1"/>
+          </a:fontRef>
+        </p:style>
+        <p:txBody>
+          <a:bodyPr rtlCol="0" anchor="ctr"/>
+          <a:lstStyle/>
+          <a:p>
+            <a:pPr algn="ctr"/>
+            <a:r>
+              <a:rPr lang="en-US" sz="4000" dirty="0"/>
+              <a:t>X</a:t>
+            </a:r>
+          </a:p>
+        </p:txBody>
+      </p:sp>
+      <p:sp>
+        <p:nvSpPr>
+          <p:cNvPr id="26" name="Rectangle 25">
+            <a:extLst>
+              <a:ext uri="{FF2B5EF4-FFF2-40B4-BE49-F238E27FC236}">
+                <a16:creationId xmlns:a16="http://schemas.microsoft.com/office/drawing/2014/main" id="{B1D4BFBE-E707-3161-F801-1C418D165FDB}"/>
+              </a:ext>
+            </a:extLst>
+          </p:cNvPr>
+          <p:cNvSpPr/>
+          <p:nvPr/>
+        </p:nvSpPr>
+        <p:spPr>
+          <a:xfrm>
+            <a:off x="19966800" y="9186765"/>
+            <a:ext cx="1648046" cy="1765005"/>
+          </a:xfrm>
+          <a:prstGeom prst="rect">
+            <a:avLst/>
+          </a:prstGeom>
+          <a:solidFill>
+            <a:schemeClr val="accent4">
+              <a:lumMod val="40000"/>
+              <a:lumOff val="60000"/>
+            </a:schemeClr>
+          </a:solidFill>
+        </p:spPr>
+        <p:style>
+          <a:lnRef idx="2">
+            <a:schemeClr val="accent1">
+              <a:shade val="50000"/>
+            </a:schemeClr>
+          </a:lnRef>
+          <a:fillRef idx="1">
+            <a:schemeClr val="accent1"/>
+          </a:fillRef>
+          <a:effectRef idx="0">
+            <a:schemeClr val="accent1"/>
+          </a:effectRef>
+          <a:fontRef idx="minor">
+            <a:schemeClr val="lt1"/>
+          </a:fontRef>
+        </p:style>
+        <p:txBody>
+          <a:bodyPr rtlCol="0" anchor="ctr"/>
+          <a:lstStyle/>
+          <a:p>
+            <a:pPr algn="ctr"/>
+            <a:r>
+              <a:rPr lang="en-US" sz="4000" dirty="0">
+                <a:solidFill>
+                  <a:schemeClr val="tx1"/>
+                </a:solidFill>
+              </a:rPr>
+              <a:t>TE</a:t>
+            </a:r>
+          </a:p>
+          <a:p>
+            <a:pPr algn="ctr"/>
+            <a:r>
+              <a:rPr lang="en-US" sz="4000" baseline="-25000" dirty="0">
+                <a:solidFill>
+                  <a:schemeClr val="tx1"/>
+                </a:solidFill>
+              </a:rPr>
+              <a:t>+ Spillover</a:t>
+            </a:r>
+          </a:p>
+        </p:txBody>
+      </p:sp>
+      <p:sp>
+        <p:nvSpPr>
+          <p:cNvPr id="27" name="TextBox 26">
+            <a:extLst>
+              <a:ext uri="{FF2B5EF4-FFF2-40B4-BE49-F238E27FC236}">
+                <a16:creationId xmlns:a16="http://schemas.microsoft.com/office/drawing/2014/main" id="{E6B386E2-99EF-60A8-A960-AE75C4C93C78}"/>
+              </a:ext>
+            </a:extLst>
+          </p:cNvPr>
+          <p:cNvSpPr txBox="1"/>
+          <p:nvPr/>
+        </p:nvSpPr>
+        <p:spPr>
+          <a:xfrm>
+            <a:off x="4757620" y="1344064"/>
+            <a:ext cx="1399357" cy="584775"/>
+          </a:xfrm>
+          <a:prstGeom prst="rect">
+            <a:avLst/>
+          </a:prstGeom>
+          <a:noFill/>
+          <a:ln>
+            <a:solidFill>
+              <a:schemeClr val="tx1"/>
+            </a:solidFill>
+          </a:ln>
+        </p:spPr>
+        <p:txBody>
+          <a:bodyPr wrap="none" rtlCol="0">
+            <a:spAutoFit/>
+          </a:bodyPr>
+          <a:lstStyle/>
+          <a:p>
+            <a:r>
+              <a:rPr lang="en-US" sz="3200" dirty="0"/>
+              <a:t>Stage 1</a:t>
+            </a:r>
+          </a:p>
+        </p:txBody>
+      </p:sp>
+      <p:sp>
+        <p:nvSpPr>
+          <p:cNvPr id="28" name="TextBox 27">
+            <a:extLst>
+              <a:ext uri="{FF2B5EF4-FFF2-40B4-BE49-F238E27FC236}">
+                <a16:creationId xmlns:a16="http://schemas.microsoft.com/office/drawing/2014/main" id="{02A512E5-C1E4-5AF1-0A98-DE55518A7568}"/>
+              </a:ext>
+            </a:extLst>
+          </p:cNvPr>
+          <p:cNvSpPr txBox="1"/>
+          <p:nvPr/>
+        </p:nvSpPr>
+        <p:spPr>
+          <a:xfrm>
+            <a:off x="6404114" y="5196750"/>
+            <a:ext cx="1399357" cy="584775"/>
+          </a:xfrm>
+          <a:prstGeom prst="rect">
+            <a:avLst/>
+          </a:prstGeom>
+          <a:noFill/>
+          <a:ln>
+            <a:solidFill>
+              <a:schemeClr val="tx1"/>
+            </a:solidFill>
+          </a:ln>
+        </p:spPr>
+        <p:txBody>
+          <a:bodyPr wrap="none" rtlCol="0">
+            <a:spAutoFit/>
+          </a:bodyPr>
+          <a:lstStyle/>
+          <a:p>
+            <a:r>
+              <a:rPr lang="en-US" sz="3200" dirty="0"/>
+              <a:t>Stage 2</a:t>
+            </a:r>
+          </a:p>
+        </p:txBody>
+      </p:sp>
+      <p:sp>
+        <p:nvSpPr>
+          <p:cNvPr id="29" name="TextBox 28">
+            <a:extLst>
+              <a:ext uri="{FF2B5EF4-FFF2-40B4-BE49-F238E27FC236}">
+                <a16:creationId xmlns:a16="http://schemas.microsoft.com/office/drawing/2014/main" id="{8D04D791-5471-BAA3-D736-9CBB28373FB4}"/>
+              </a:ext>
+            </a:extLst>
+          </p:cNvPr>
+          <p:cNvSpPr txBox="1"/>
+          <p:nvPr/>
+        </p:nvSpPr>
+        <p:spPr>
+          <a:xfrm>
+            <a:off x="14291086" y="7540495"/>
+            <a:ext cx="1399357" cy="584775"/>
+          </a:xfrm>
+          <a:prstGeom prst="rect">
+            <a:avLst/>
+          </a:prstGeom>
+          <a:noFill/>
+          <a:ln>
+            <a:solidFill>
+              <a:schemeClr val="tx1"/>
+            </a:solidFill>
+          </a:ln>
+        </p:spPr>
+        <p:txBody>
+          <a:bodyPr wrap="none" rtlCol="0">
+            <a:spAutoFit/>
+          </a:bodyPr>
+          <a:lstStyle/>
+          <a:p>
+            <a:r>
+              <a:rPr lang="en-US" sz="3200" dirty="0"/>
+              <a:t>Stage 3</a:t>
+            </a:r>
+          </a:p>
+        </p:txBody>
+      </p:sp>
+      <p:cxnSp>
+        <p:nvCxnSpPr>
+          <p:cNvPr id="31" name="Straight Arrow Connector 30">
+            <a:extLst>
+              <a:ext uri="{FF2B5EF4-FFF2-40B4-BE49-F238E27FC236}">
+                <a16:creationId xmlns:a16="http://schemas.microsoft.com/office/drawing/2014/main" id="{14BD656E-1FB0-9FCE-F850-F8214EEF33D6}"/>
+              </a:ext>
+            </a:extLst>
+          </p:cNvPr>
+          <p:cNvCxnSpPr>
+            <a:cxnSpLocks/>
+            <a:endCxn id="14" idx="1"/>
+          </p:cNvCxnSpPr>
+          <p:nvPr/>
+        </p:nvCxnSpPr>
+        <p:spPr>
+          <a:xfrm>
+            <a:off x="7633590" y="3242226"/>
+            <a:ext cx="1828331" cy="0"/>
+          </a:xfrm>
+          <a:prstGeom prst="straightConnector1">
+            <a:avLst/>
+          </a:prstGeom>
+          <a:ln w="69850">
+            <a:tailEnd type="triangle" w="lg" len="lg"/>
+          </a:ln>
+        </p:spPr>
+        <p:style>
+          <a:lnRef idx="1">
+            <a:schemeClr val="dk1"/>
+          </a:lnRef>
+          <a:fillRef idx="0">
+            <a:schemeClr val="dk1"/>
+          </a:fillRef>
+          <a:effectRef idx="0">
+            <a:schemeClr val="dk1"/>
+          </a:effectRef>
+          <a:fontRef idx="minor">
+            <a:schemeClr val="tx1"/>
+          </a:fontRef>
+        </p:style>
+      </p:cxnSp>
+      <p:cxnSp>
+        <p:nvCxnSpPr>
+          <p:cNvPr id="32" name="Straight Arrow Connector 31">
+            <a:extLst>
+              <a:ext uri="{FF2B5EF4-FFF2-40B4-BE49-F238E27FC236}">
+                <a16:creationId xmlns:a16="http://schemas.microsoft.com/office/drawing/2014/main" id="{2A484860-E493-2BCA-F701-D290AE5FF666}"/>
+              </a:ext>
+            </a:extLst>
+          </p:cNvPr>
+          <p:cNvCxnSpPr>
+            <a:cxnSpLocks/>
+          </p:cNvCxnSpPr>
+          <p:nvPr/>
+        </p:nvCxnSpPr>
+        <p:spPr>
+          <a:xfrm>
+            <a:off x="9283216" y="6929842"/>
+            <a:ext cx="1786999" cy="0"/>
+          </a:xfrm>
+          <a:prstGeom prst="straightConnector1">
+            <a:avLst/>
+          </a:prstGeom>
+          <a:ln w="69850">
+            <a:tailEnd type="triangle" w="lg" len="lg"/>
+          </a:ln>
+        </p:spPr>
+        <p:style>
+          <a:lnRef idx="1">
+            <a:schemeClr val="dk1"/>
+          </a:lnRef>
+          <a:fillRef idx="0">
+            <a:schemeClr val="dk1"/>
+          </a:fillRef>
+          <a:effectRef idx="0">
+            <a:schemeClr val="dk1"/>
+          </a:effectRef>
+          <a:fontRef idx="minor">
+            <a:schemeClr val="tx1"/>
+          </a:fontRef>
+        </p:style>
+      </p:cxnSp>
+      <p:cxnSp>
+        <p:nvCxnSpPr>
+          <p:cNvPr id="33" name="Straight Arrow Connector 32">
+            <a:extLst>
+              <a:ext uri="{FF2B5EF4-FFF2-40B4-BE49-F238E27FC236}">
+                <a16:creationId xmlns:a16="http://schemas.microsoft.com/office/drawing/2014/main" id="{A231A8D1-D706-50A8-A0EC-695804366FF1}"/>
+              </a:ext>
+            </a:extLst>
+          </p:cNvPr>
+          <p:cNvCxnSpPr>
+            <a:cxnSpLocks/>
+          </p:cNvCxnSpPr>
+          <p:nvPr/>
+        </p:nvCxnSpPr>
+        <p:spPr>
+          <a:xfrm flipV="1">
+            <a:off x="17769016" y="10069267"/>
+            <a:ext cx="2197783" cy="1"/>
+          </a:xfrm>
+          <a:prstGeom prst="straightConnector1">
+            <a:avLst/>
+          </a:prstGeom>
+          <a:ln w="69850">
+            <a:tailEnd type="triangle" w="lg" len="lg"/>
+          </a:ln>
+        </p:spPr>
+        <p:style>
+          <a:lnRef idx="1">
+            <a:schemeClr val="dk1"/>
+          </a:lnRef>
+          <a:fillRef idx="0">
+            <a:schemeClr val="dk1"/>
+          </a:fillRef>
+          <a:effectRef idx="0">
+            <a:schemeClr val="dk1"/>
+          </a:effectRef>
+          <a:fontRef idx="minor">
+            <a:schemeClr val="tx1"/>
+          </a:fontRef>
+        </p:style>
+      </p:cxnSp>
+      <p:sp>
+        <p:nvSpPr>
+          <p:cNvPr id="37" name="Left Brace 36">
+            <a:extLst>
+              <a:ext uri="{FF2B5EF4-FFF2-40B4-BE49-F238E27FC236}">
+                <a16:creationId xmlns:a16="http://schemas.microsoft.com/office/drawing/2014/main" id="{3632D5B1-762A-F924-A041-414F9F0DF8A5}"/>
+              </a:ext>
+            </a:extLst>
+          </p:cNvPr>
+          <p:cNvSpPr/>
+          <p:nvPr/>
+        </p:nvSpPr>
+        <p:spPr>
+          <a:xfrm rot="10800000">
+            <a:off x="2209552" y="746296"/>
+            <a:ext cx="593124" cy="5029195"/>
+          </a:xfrm>
+          <a:prstGeom prst="leftBrace">
+            <a:avLst/>
+          </a:prstGeom>
+          <a:ln w="57150"/>
+        </p:spPr>
+        <p:style>
+          <a:lnRef idx="1">
+            <a:schemeClr val="dk1"/>
+          </a:lnRef>
+          <a:fillRef idx="0">
+            <a:schemeClr val="dk1"/>
+          </a:fillRef>
+          <a:effectRef idx="0">
+            <a:schemeClr val="dk1"/>
+          </a:effectRef>
+          <a:fontRef idx="minor">
+            <a:schemeClr val="tx1"/>
+          </a:fontRef>
+        </p:style>
+        <p:txBody>
+          <a:bodyPr rtlCol="0" anchor="ctr"/>
+          <a:lstStyle/>
+          <a:p>
+            <a:pPr algn="ctr"/>
+            <a:endParaRPr lang="en-US"/>
+          </a:p>
+        </p:txBody>
+      </p:sp>
+      <p:sp>
+        <p:nvSpPr>
+          <p:cNvPr id="43" name="Left Brace 42">
+            <a:extLst>
+              <a:ext uri="{FF2B5EF4-FFF2-40B4-BE49-F238E27FC236}">
+                <a16:creationId xmlns:a16="http://schemas.microsoft.com/office/drawing/2014/main" id="{A0AB5C74-D9A6-36A0-6F50-D20A005E7243}"/>
+              </a:ext>
+            </a:extLst>
+          </p:cNvPr>
+          <p:cNvSpPr/>
+          <p:nvPr/>
+        </p:nvSpPr>
+        <p:spPr>
+          <a:xfrm rot="10800000">
+            <a:off x="7432831" y="2539565"/>
+            <a:ext cx="165738" cy="1405319"/>
+          </a:xfrm>
+          <a:prstGeom prst="leftBrace">
+            <a:avLst/>
+          </a:prstGeom>
+          <a:ln w="57150"/>
+        </p:spPr>
+        <p:style>
+          <a:lnRef idx="1">
+            <a:schemeClr val="dk1"/>
+          </a:lnRef>
+          <a:fillRef idx="0">
+            <a:schemeClr val="dk1"/>
+          </a:fillRef>
+          <a:effectRef idx="0">
+            <a:schemeClr val="dk1"/>
+          </a:effectRef>
+          <a:fontRef idx="minor">
+            <a:schemeClr val="tx1"/>
+          </a:fontRef>
+        </p:style>
+        <p:txBody>
+          <a:bodyPr rtlCol="0" anchor="ctr"/>
+          <a:lstStyle/>
+          <a:p>
+            <a:pPr algn="ctr"/>
+            <a:endParaRPr lang="en-US"/>
+          </a:p>
+        </p:txBody>
+      </p:sp>
+      <p:sp>
+        <p:nvSpPr>
+          <p:cNvPr id="44" name="Left Brace 43">
+            <a:extLst>
+              <a:ext uri="{FF2B5EF4-FFF2-40B4-BE49-F238E27FC236}">
+                <a16:creationId xmlns:a16="http://schemas.microsoft.com/office/drawing/2014/main" id="{9792E1F7-3953-BEF7-E989-DB14E288D3CC}"/>
+              </a:ext>
+            </a:extLst>
+          </p:cNvPr>
+          <p:cNvSpPr/>
+          <p:nvPr/>
+        </p:nvSpPr>
+        <p:spPr>
+          <a:xfrm rot="10800000">
+            <a:off x="9068050" y="6226010"/>
+            <a:ext cx="165738" cy="1405319"/>
+          </a:xfrm>
+          <a:prstGeom prst="leftBrace">
+            <a:avLst/>
+          </a:prstGeom>
+          <a:ln w="57150"/>
+        </p:spPr>
+        <p:style>
+          <a:lnRef idx="1">
+            <a:schemeClr val="dk1"/>
+          </a:lnRef>
+          <a:fillRef idx="0">
+            <a:schemeClr val="dk1"/>
+          </a:fillRef>
+          <a:effectRef idx="0">
+            <a:schemeClr val="dk1"/>
+          </a:effectRef>
+          <a:fontRef idx="minor">
+            <a:schemeClr val="tx1"/>
+          </a:fontRef>
+        </p:style>
+        <p:txBody>
+          <a:bodyPr rtlCol="0" anchor="ctr"/>
+          <a:lstStyle/>
+          <a:p>
+            <a:pPr algn="ctr"/>
+            <a:endParaRPr lang="en-US"/>
+          </a:p>
+        </p:txBody>
+      </p:sp>
+      <p:sp>
+        <p:nvSpPr>
+          <p:cNvPr id="47" name="Left Brace 46">
+            <a:extLst>
+              <a:ext uri="{FF2B5EF4-FFF2-40B4-BE49-F238E27FC236}">
+                <a16:creationId xmlns:a16="http://schemas.microsoft.com/office/drawing/2014/main" id="{D3BC86BD-A11F-E810-FE2A-CB351E44CD28}"/>
+              </a:ext>
+            </a:extLst>
+          </p:cNvPr>
+          <p:cNvSpPr/>
+          <p:nvPr/>
+        </p:nvSpPr>
+        <p:spPr>
+          <a:xfrm rot="10800000">
+            <a:off x="17227443" y="8311544"/>
+            <a:ext cx="350807" cy="3522717"/>
+          </a:xfrm>
+          <a:prstGeom prst="leftBrace">
+            <a:avLst/>
+          </a:prstGeom>
+          <a:ln w="57150"/>
+        </p:spPr>
+        <p:style>
+          <a:lnRef idx="1">
+            <a:schemeClr val="dk1"/>
+          </a:lnRef>
+          <a:fillRef idx="0">
+            <a:schemeClr val="dk1"/>
+          </a:fillRef>
+          <a:effectRef idx="0">
+            <a:schemeClr val="dk1"/>
+          </a:effectRef>
+          <a:fontRef idx="minor">
+            <a:schemeClr val="tx1"/>
+          </a:fontRef>
+        </p:style>
+        <p:txBody>
+          <a:bodyPr rtlCol="0" anchor="ctr"/>
+          <a:lstStyle/>
+          <a:p>
+            <a:pPr algn="ctr"/>
+            <a:endParaRPr lang="en-US"/>
+          </a:p>
+        </p:txBody>
+      </p:sp>
+    </p:spTree>
+    <p:extLst>
+      <p:ext uri="{BB962C8B-B14F-4D97-AF65-F5344CB8AC3E}">
+        <p14:creationId xmlns:p14="http://schemas.microsoft.com/office/powerpoint/2010/main" val="2953911092"/>
       </p:ext>
     </p:extLst>
   </p:cSld>

</xml_diff>